<commit_message>
up Co-authored-by: Redshark61 <Redshark61@users.noreply.github.com>
</commit_message>
<xml_diff>
--- a/Revu-Retro/Sprint8.pptx
+++ b/Revu-Retro/Sprint8.pptx
@@ -8,9 +8,12 @@
   <p:sldIdLst>
     <p:sldId id="256" r:id="rId3"/>
     <p:sldId id="257" r:id="rId4"/>
-    <p:sldId id="258" r:id="rId5"/>
-    <p:sldId id="259" r:id="rId6"/>
-    <p:sldId id="260" r:id="rId7"/>
+    <p:sldId id="261" r:id="rId5"/>
+    <p:sldId id="258" r:id="rId6"/>
+    <p:sldId id="263" r:id="rId7"/>
+    <p:sldId id="262" r:id="rId8"/>
+    <p:sldId id="259" r:id="rId9"/>
+    <p:sldId id="260" r:id="rId10"/>
   </p:sldIdLst>
   <p:sldSz cx="12192000" cy="6858000"/>
   <p:notesSz cx="7559675" cy="10691813"/>
@@ -4455,7 +4458,7 @@
     <mc:Choice Requires="p14">
       <p:transition spd="slow" p14:dur="2000"/>
     </mc:Choice>
-    <mc:Fallback xmlns="" xmlns:p15="http://schemas.microsoft.com/office/powerpoint/2012/main">
+    <mc:Fallback xmlns:p15="http://schemas.microsoft.com/office/powerpoint/2012/main" xmlns="">
       <p:transition spd="slow"/>
     </mc:Fallback>
   </mc:AlternateContent>
@@ -4555,7 +4558,7 @@
         <p:spPr>
           <a:xfrm>
             <a:off x="5400000" y="1440000"/>
-            <a:ext cx="1439640" cy="583560"/>
+            <a:ext cx="1439640" cy="589477"/>
           </a:xfrm>
           <a:prstGeom prst="rect">
             <a:avLst/>
@@ -4589,16 +4592,16 @@
               </a:lnSpc>
             </a:pPr>
             <a:r>
-              <a:rPr lang="fr-FR" sz="3600" b="0" strike="noStrike" spc="-1">
+              <a:rPr lang="fr-FR" sz="3600" b="0" strike="noStrike" spc="-1" dirty="0" smtClean="0">
                 <a:solidFill>
                   <a:srgbClr val="000000"/>
                 </a:solidFill>
                 <a:latin typeface="Agency FB"/>
                 <a:ea typeface="DejaVu Sans"/>
               </a:rPr>
-              <a:t>Trello</a:t>
+              <a:t>Kanban</a:t>
             </a:r>
-            <a:endParaRPr lang="fr-FR" sz="3600" b="0" strike="noStrike" spc="-1">
+            <a:endParaRPr lang="fr-FR" sz="3600" b="0" strike="noStrike" spc="-1" dirty="0">
               <a:latin typeface="Arial"/>
             </a:endParaRPr>
           </a:p>
@@ -4637,7 +4640,7 @@
     <mc:Choice Requires="p14">
       <p:transition spd="slow" p14:dur="2000"/>
     </mc:Choice>
-    <mc:Fallback xmlns="" xmlns:p15="http://schemas.microsoft.com/office/powerpoint/2012/main">
+    <mc:Fallback xmlns:p15="http://schemas.microsoft.com/office/powerpoint/2012/main" xmlns="">
       <p:transition spd="slow"/>
     </mc:Fallback>
   </mc:AlternateContent>
@@ -4681,18 +4684,18 @@
       </p:grpSpPr>
       <p:sp>
         <p:nvSpPr>
-          <p:cNvPr id="81" name="PlaceHolder 1"/>
-          <p:cNvSpPr>
-            <a:spLocks noGrp="1"/>
-          </p:cNvSpPr>
-          <p:nvPr>
-            <p:ph type="title"/>
+          <p:cNvPr id="78" name="PlaceHolder 1"/>
+          <p:cNvSpPr>
+            <a:spLocks noGrp="1"/>
+          </p:cNvSpPr>
+          <p:nvPr>
+            <p:ph type="title" idx="4294967295"/>
           </p:nvPr>
         </p:nvSpPr>
         <p:spPr>
           <a:xfrm>
             <a:off x="838080" y="365040"/>
-            <a:ext cx="10514880" cy="1324800"/>
+            <a:ext cx="3841920" cy="1324800"/>
           </a:xfrm>
           <a:prstGeom prst="rect">
             <a:avLst/>
@@ -4714,7 +4717,7 @@
               </a:lnSpc>
             </a:pPr>
             <a:r>
-              <a:rPr lang="fr-FR" sz="6000" b="0" strike="noStrike" spc="-1" dirty="0">
+              <a:rPr lang="fr-FR" sz="6000" b="0" strike="noStrike" spc="-1">
                 <a:solidFill>
                   <a:srgbClr val="000000"/>
                 </a:solidFill>
@@ -4722,22 +4725,22 @@
               </a:rPr>
               <a:t>Avancées</a:t>
             </a:r>
-            <a:endParaRPr lang="fr-FR" sz="6000" b="0" strike="noStrike" spc="-1" dirty="0">
-              <a:latin typeface="Arial"/>
-            </a:endParaRPr>
-          </a:p>
-        </p:txBody>
-      </p:sp>
-      <p:sp>
-        <p:nvSpPr>
-          <p:cNvPr id="82" name="ZoneTexte 1"/>
+            <a:endParaRPr lang="fr-FR" sz="6000" b="0" strike="noStrike" spc="-1">
+              <a:latin typeface="Arial"/>
+            </a:endParaRPr>
+          </a:p>
+        </p:txBody>
+      </p:sp>
+      <p:sp>
+        <p:nvSpPr>
+          <p:cNvPr id="79" name="ZoneTexte 7"/>
           <p:cNvSpPr/>
           <p:nvPr/>
         </p:nvSpPr>
         <p:spPr>
           <a:xfrm>
-            <a:off x="4680000" y="915840"/>
-            <a:ext cx="3717551" cy="583920"/>
+            <a:off x="1661040" y="1798320"/>
+            <a:ext cx="797680" cy="589477"/>
           </a:xfrm>
           <a:prstGeom prst="rect">
             <a:avLst/>
@@ -4771,14 +4774,14 @@
               </a:lnSpc>
             </a:pPr>
             <a:r>
-              <a:rPr lang="fr-FR" sz="3600" b="0" strike="noStrike" spc="-1" dirty="0" smtClean="0">
+              <a:rPr lang="fr-FR" sz="3600" spc="-1" dirty="0" smtClean="0">
                 <a:solidFill>
                   <a:srgbClr val="000000"/>
                 </a:solidFill>
                 <a:latin typeface="Agency FB"/>
                 <a:ea typeface="DejaVu Sans"/>
               </a:rPr>
-              <a:t>Création de personnage</a:t>
+              <a:t>BDD</a:t>
             </a:r>
             <a:endParaRPr lang="fr-FR" sz="3600" b="0" strike="noStrike" spc="-1" dirty="0">
               <a:latin typeface="Arial"/>
@@ -4802,8 +4805,8 @@
         </p:blipFill>
         <p:spPr>
           <a:xfrm>
-            <a:off x="1711067" y="1908772"/>
-            <a:ext cx="8963154" cy="4223253"/>
+            <a:off x="4680000" y="0"/>
+            <a:ext cx="7499794" cy="6874811"/>
           </a:xfrm>
           <a:prstGeom prst="rect">
             <a:avLst/>
@@ -4811,6 +4814,11 @@
         </p:spPr>
       </p:pic>
     </p:spTree>
+    <p:extLst>
+      <p:ext uri="{BB962C8B-B14F-4D97-AF65-F5344CB8AC3E}">
+        <p14:creationId xmlns:p14="http://schemas.microsoft.com/office/powerpoint/2010/main" val="988396622"/>
+      </p:ext>
+    </p:extLst>
   </p:cSld>
   <p:clrMapOvr>
     <a:masterClrMapping/>
@@ -4819,7 +4827,7 @@
     <mc:Choice Requires="p14">
       <p:transition spd="slow" p14:dur="2000"/>
     </mc:Choice>
-    <mc:Fallback xmlns="" xmlns:p15="http://schemas.microsoft.com/office/powerpoint/2012/main">
+    <mc:Fallback xmlns:p15="http://schemas.microsoft.com/office/powerpoint/2012/main" xmlns="">
       <p:transition spd="slow"/>
     </mc:Fallback>
   </mc:AlternateContent>
@@ -4863,7 +4871,7 @@
       </p:grpSpPr>
       <p:sp>
         <p:nvSpPr>
-          <p:cNvPr id="84" name="PlaceHolder 1"/>
+          <p:cNvPr id="81" name="PlaceHolder 1"/>
           <p:cNvSpPr>
             <a:spLocks noGrp="1"/>
           </p:cNvSpPr>
@@ -4873,7 +4881,7 @@
         </p:nvSpPr>
         <p:spPr>
           <a:xfrm>
-            <a:off x="757440" y="2314800"/>
+            <a:off x="838080" y="365040"/>
             <a:ext cx="10514880" cy="1324800"/>
           </a:xfrm>
           <a:prstGeom prst="rect">
@@ -4890,26 +4898,108 @@
           </a:bodyPr>
           <a:lstStyle/>
           <a:p>
-            <a:pPr algn="ctr">
+            <a:pPr>
               <a:lnSpc>
                 <a:spcPct val="90000"/>
               </a:lnSpc>
             </a:pPr>
             <a:r>
-              <a:rPr lang="fr-FR" sz="6000" b="0" strike="noStrike" spc="-1">
+              <a:rPr lang="fr-FR" sz="6000" b="0" strike="noStrike" spc="-1" dirty="0">
                 <a:solidFill>
                   <a:srgbClr val="000000"/>
                 </a:solidFill>
                 <a:latin typeface="Agency FB"/>
               </a:rPr>
-              <a:t>Retro</a:t>
+              <a:t>Avancées</a:t>
             </a:r>
-            <a:endParaRPr lang="fr-FR" sz="6000" b="0" strike="noStrike" spc="-1">
-              <a:latin typeface="Arial"/>
-            </a:endParaRPr>
-          </a:p>
-        </p:txBody>
-      </p:sp>
+            <a:endParaRPr lang="fr-FR" sz="6000" b="0" strike="noStrike" spc="-1" dirty="0">
+              <a:latin typeface="Arial"/>
+            </a:endParaRPr>
+          </a:p>
+        </p:txBody>
+      </p:sp>
+      <p:sp>
+        <p:nvSpPr>
+          <p:cNvPr id="82" name="ZoneTexte 1"/>
+          <p:cNvSpPr/>
+          <p:nvPr/>
+        </p:nvSpPr>
+        <p:spPr>
+          <a:xfrm>
+            <a:off x="838080" y="1689840"/>
+            <a:ext cx="3717551" cy="583920"/>
+          </a:xfrm>
+          <a:prstGeom prst="rect">
+            <a:avLst/>
+          </a:prstGeom>
+          <a:noFill/>
+          <a:ln w="0">
+            <a:noFill/>
+          </a:ln>
+        </p:spPr>
+        <p:style>
+          <a:lnRef idx="0">
+            <a:scrgbClr r="0" g="0" b="0"/>
+          </a:lnRef>
+          <a:fillRef idx="0">
+            <a:scrgbClr r="0" g="0" b="0"/>
+          </a:fillRef>
+          <a:effectRef idx="0">
+            <a:scrgbClr r="0" g="0" b="0"/>
+          </a:effectRef>
+          <a:fontRef idx="minor"/>
+        </p:style>
+        <p:txBody>
+          <a:bodyPr wrap="square" lIns="90000" tIns="45000" rIns="90000" bIns="45000" anchor="t">
+            <a:spAutoFit/>
+          </a:bodyPr>
+          <a:lstStyle/>
+          <a:p>
+            <a:pPr>
+              <a:lnSpc>
+                <a:spcPct val="90000"/>
+              </a:lnSpc>
+            </a:pPr>
+            <a:r>
+              <a:rPr lang="fr-FR" sz="3600" b="0" strike="noStrike" spc="-1" dirty="0" smtClean="0">
+                <a:solidFill>
+                  <a:srgbClr val="000000"/>
+                </a:solidFill>
+                <a:latin typeface="Agency FB"/>
+                <a:ea typeface="DejaVu Sans"/>
+              </a:rPr>
+              <a:t>Création de personnage</a:t>
+            </a:r>
+            <a:endParaRPr lang="fr-FR" sz="3600" b="0" strike="noStrike" spc="-1" dirty="0">
+              <a:latin typeface="Arial"/>
+            </a:endParaRPr>
+          </a:p>
+        </p:txBody>
+      </p:sp>
+      <p:pic>
+        <p:nvPicPr>
+          <p:cNvPr id="3" name="Image 2"/>
+          <p:cNvPicPr>
+            <a:picLocks noChangeAspect="1"/>
+          </p:cNvPicPr>
+          <p:nvPr/>
+        </p:nvPicPr>
+        <p:blipFill>
+          <a:blip r:embed="rId3"/>
+          <a:stretch>
+            <a:fillRect/>
+          </a:stretch>
+        </p:blipFill>
+        <p:spPr>
+          <a:xfrm>
+            <a:off x="6231648" y="0"/>
+            <a:ext cx="3186672" cy="6811073"/>
+          </a:xfrm>
+          <a:prstGeom prst="rect">
+            <a:avLst/>
+          </a:prstGeom>
+        </p:spPr>
+      </p:pic>
     </p:spTree>
   </p:cSld>
   <p:clrMapOvr>
@@ -4919,7 +5009,7 @@
     <mc:Choice Requires="p14">
       <p:transition spd="slow" p14:dur="2000"/>
     </mc:Choice>
-    <mc:Fallback xmlns="" xmlns:p15="http://schemas.microsoft.com/office/powerpoint/2012/main">
+    <mc:Fallback xmlns:p15="http://schemas.microsoft.com/office/powerpoint/2012/main" xmlns="">
       <p:transition spd="slow"/>
     </mc:Fallback>
   </mc:AlternateContent>
@@ -4963,6 +5053,480 @@
       </p:grpSpPr>
       <p:sp>
         <p:nvSpPr>
+          <p:cNvPr id="81" name="PlaceHolder 1"/>
+          <p:cNvSpPr>
+            <a:spLocks noGrp="1"/>
+          </p:cNvSpPr>
+          <p:nvPr>
+            <p:ph type="title" idx="4294967295"/>
+          </p:nvPr>
+        </p:nvSpPr>
+        <p:spPr>
+          <a:xfrm>
+            <a:off x="838080" y="365040"/>
+            <a:ext cx="10514880" cy="1324800"/>
+          </a:xfrm>
+          <a:prstGeom prst="rect">
+            <a:avLst/>
+          </a:prstGeom>
+          <a:noFill/>
+          <a:ln w="0">
+            <a:noFill/>
+          </a:ln>
+        </p:spPr>
+        <p:txBody>
+          <a:bodyPr lIns="90000" tIns="45000" rIns="90000" bIns="45000" anchor="ctr">
+            <a:normAutofit/>
+          </a:bodyPr>
+          <a:lstStyle/>
+          <a:p>
+            <a:pPr>
+              <a:lnSpc>
+                <a:spcPct val="90000"/>
+              </a:lnSpc>
+            </a:pPr>
+            <a:r>
+              <a:rPr lang="fr-FR" sz="6000" b="0" strike="noStrike" spc="-1" dirty="0">
+                <a:solidFill>
+                  <a:srgbClr val="000000"/>
+                </a:solidFill>
+                <a:latin typeface="Agency FB"/>
+              </a:rPr>
+              <a:t>Avancées</a:t>
+            </a:r>
+            <a:endParaRPr lang="fr-FR" sz="6000" b="0" strike="noStrike" spc="-1" dirty="0">
+              <a:latin typeface="Arial"/>
+            </a:endParaRPr>
+          </a:p>
+        </p:txBody>
+      </p:sp>
+      <p:sp>
+        <p:nvSpPr>
+          <p:cNvPr id="82" name="ZoneTexte 1"/>
+          <p:cNvSpPr/>
+          <p:nvPr/>
+        </p:nvSpPr>
+        <p:spPr>
+          <a:xfrm>
+            <a:off x="4680000" y="915840"/>
+            <a:ext cx="3717551" cy="583920"/>
+          </a:xfrm>
+          <a:prstGeom prst="rect">
+            <a:avLst/>
+          </a:prstGeom>
+          <a:noFill/>
+          <a:ln w="0">
+            <a:noFill/>
+          </a:ln>
+        </p:spPr>
+        <p:style>
+          <a:lnRef idx="0">
+            <a:scrgbClr r="0" g="0" b="0"/>
+          </a:lnRef>
+          <a:fillRef idx="0">
+            <a:scrgbClr r="0" g="0" b="0"/>
+          </a:fillRef>
+          <a:effectRef idx="0">
+            <a:scrgbClr r="0" g="0" b="0"/>
+          </a:effectRef>
+          <a:fontRef idx="minor"/>
+        </p:style>
+        <p:txBody>
+          <a:bodyPr wrap="square" lIns="90000" tIns="45000" rIns="90000" bIns="45000" anchor="t">
+            <a:spAutoFit/>
+          </a:bodyPr>
+          <a:lstStyle/>
+          <a:p>
+            <a:pPr>
+              <a:lnSpc>
+                <a:spcPct val="90000"/>
+              </a:lnSpc>
+            </a:pPr>
+            <a:r>
+              <a:rPr lang="fr-FR" sz="3600" b="0" strike="noStrike" spc="-1" dirty="0" smtClean="0">
+                <a:solidFill>
+                  <a:srgbClr val="000000"/>
+                </a:solidFill>
+                <a:latin typeface="Agency FB"/>
+                <a:ea typeface="DejaVu Sans"/>
+              </a:rPr>
+              <a:t>Création de personnage</a:t>
+            </a:r>
+            <a:endParaRPr lang="fr-FR" sz="3600" b="0" strike="noStrike" spc="-1" dirty="0">
+              <a:latin typeface="Arial"/>
+            </a:endParaRPr>
+          </a:p>
+        </p:txBody>
+      </p:sp>
+      <p:pic>
+        <p:nvPicPr>
+          <p:cNvPr id="3" name="Image 2"/>
+          <p:cNvPicPr>
+            <a:picLocks noChangeAspect="1"/>
+          </p:cNvPicPr>
+          <p:nvPr/>
+        </p:nvPicPr>
+        <p:blipFill>
+          <a:blip r:embed="rId3"/>
+          <a:stretch>
+            <a:fillRect/>
+          </a:stretch>
+        </p:blipFill>
+        <p:spPr>
+          <a:xfrm>
+            <a:off x="1617211" y="1837246"/>
+            <a:ext cx="9586537" cy="4447583"/>
+          </a:xfrm>
+          <a:prstGeom prst="rect">
+            <a:avLst/>
+          </a:prstGeom>
+        </p:spPr>
+      </p:pic>
+    </p:spTree>
+    <p:extLst>
+      <p:ext uri="{BB962C8B-B14F-4D97-AF65-F5344CB8AC3E}">
+        <p14:creationId xmlns:p14="http://schemas.microsoft.com/office/powerpoint/2010/main" val="3739143112"/>
+      </p:ext>
+    </p:extLst>
+  </p:cSld>
+  <p:clrMapOvr>
+    <a:masterClrMapping/>
+  </p:clrMapOvr>
+  <mc:AlternateContent xmlns:mc="http://schemas.openxmlformats.org/markup-compatibility/2006" xmlns:p14="http://schemas.microsoft.com/office/powerpoint/2010/main">
+    <mc:Choice Requires="p14">
+      <p:transition spd="slow" p14:dur="2000"/>
+    </mc:Choice>
+    <mc:Fallback xmlns:p15="http://schemas.microsoft.com/office/powerpoint/2012/main" xmlns="">
+      <p:transition spd="slow"/>
+    </mc:Fallback>
+  </mc:AlternateContent>
+  <p:timing>
+    <p:tnLst>
+      <p:par>
+        <p:cTn id="1" dur="indefinite" restart="never" nodeType="tmRoot"/>
+      </p:par>
+    </p:tnLst>
+  </p:timing>
+</p:sld>
+</file>
+
+<file path=ppt/slides/slide6.xml><?xml version="1.0" encoding="utf-8"?>
+<p:sld xmlns:a="http://schemas.openxmlformats.org/drawingml/2006/main" xmlns:r="http://schemas.openxmlformats.org/officeDocument/2006/relationships" xmlns:p="http://schemas.openxmlformats.org/presentationml/2006/main">
+  <p:cSld>
+    <p:bg>
+      <p:bgPr>
+        <a:blipFill rotWithShape="0">
+          <a:blip r:embed="rId2">
+            <a:alphaModFix amt="40000"/>
+          </a:blip>
+          <a:stretch/>
+        </a:blipFill>
+        <a:effectLst/>
+      </p:bgPr>
+    </p:bg>
+    <p:spTree>
+      <p:nvGrpSpPr>
+        <p:cNvPr id="1" name=""/>
+        <p:cNvGrpSpPr/>
+        <p:nvPr/>
+      </p:nvGrpSpPr>
+      <p:grpSpPr>
+        <a:xfrm>
+          <a:off x="0" y="0"/>
+          <a:ext cx="0" cy="0"/>
+          <a:chOff x="0" y="0"/>
+          <a:chExt cx="0" cy="0"/>
+        </a:xfrm>
+      </p:grpSpPr>
+      <p:sp>
+        <p:nvSpPr>
+          <p:cNvPr id="81" name="PlaceHolder 1"/>
+          <p:cNvSpPr>
+            <a:spLocks noGrp="1"/>
+          </p:cNvSpPr>
+          <p:nvPr>
+            <p:ph type="title" idx="4294967295"/>
+          </p:nvPr>
+        </p:nvSpPr>
+        <p:spPr>
+          <a:xfrm>
+            <a:off x="838080" y="365040"/>
+            <a:ext cx="10514880" cy="1324800"/>
+          </a:xfrm>
+          <a:prstGeom prst="rect">
+            <a:avLst/>
+          </a:prstGeom>
+          <a:noFill/>
+          <a:ln w="0">
+            <a:noFill/>
+          </a:ln>
+        </p:spPr>
+        <p:txBody>
+          <a:bodyPr lIns="90000" tIns="45000" rIns="90000" bIns="45000" anchor="ctr">
+            <a:normAutofit/>
+          </a:bodyPr>
+          <a:lstStyle/>
+          <a:p>
+            <a:pPr>
+              <a:lnSpc>
+                <a:spcPct val="90000"/>
+              </a:lnSpc>
+            </a:pPr>
+            <a:r>
+              <a:rPr lang="fr-FR" sz="6000" b="0" strike="noStrike" spc="-1" dirty="0">
+                <a:solidFill>
+                  <a:srgbClr val="000000"/>
+                </a:solidFill>
+                <a:latin typeface="Agency FB"/>
+              </a:rPr>
+              <a:t>Avancées</a:t>
+            </a:r>
+            <a:endParaRPr lang="fr-FR" sz="6000" b="0" strike="noStrike" spc="-1" dirty="0">
+              <a:latin typeface="Arial"/>
+            </a:endParaRPr>
+          </a:p>
+        </p:txBody>
+      </p:sp>
+      <p:sp>
+        <p:nvSpPr>
+          <p:cNvPr id="82" name="ZoneTexte 1"/>
+          <p:cNvSpPr/>
+          <p:nvPr/>
+        </p:nvSpPr>
+        <p:spPr>
+          <a:xfrm>
+            <a:off x="4680000" y="915840"/>
+            <a:ext cx="3717551" cy="583920"/>
+          </a:xfrm>
+          <a:prstGeom prst="rect">
+            <a:avLst/>
+          </a:prstGeom>
+          <a:noFill/>
+          <a:ln w="0">
+            <a:noFill/>
+          </a:ln>
+        </p:spPr>
+        <p:style>
+          <a:lnRef idx="0">
+            <a:scrgbClr r="0" g="0" b="0"/>
+          </a:lnRef>
+          <a:fillRef idx="0">
+            <a:scrgbClr r="0" g="0" b="0"/>
+          </a:fillRef>
+          <a:effectRef idx="0">
+            <a:scrgbClr r="0" g="0" b="0"/>
+          </a:effectRef>
+          <a:fontRef idx="minor"/>
+        </p:style>
+        <p:txBody>
+          <a:bodyPr wrap="square" lIns="90000" tIns="45000" rIns="90000" bIns="45000" anchor="t">
+            <a:spAutoFit/>
+          </a:bodyPr>
+          <a:lstStyle/>
+          <a:p>
+            <a:pPr>
+              <a:lnSpc>
+                <a:spcPct val="90000"/>
+              </a:lnSpc>
+            </a:pPr>
+            <a:r>
+              <a:rPr lang="fr-FR" sz="3600" b="0" strike="noStrike" spc="-1" dirty="0" smtClean="0">
+                <a:solidFill>
+                  <a:srgbClr val="000000"/>
+                </a:solidFill>
+                <a:latin typeface="Agency FB"/>
+                <a:ea typeface="DejaVu Sans"/>
+              </a:rPr>
+              <a:t>Création de personnage</a:t>
+            </a:r>
+            <a:endParaRPr lang="fr-FR" sz="3600" b="0" strike="noStrike" spc="-1" dirty="0">
+              <a:latin typeface="Arial"/>
+            </a:endParaRPr>
+          </a:p>
+        </p:txBody>
+      </p:sp>
+      <p:pic>
+        <p:nvPicPr>
+          <p:cNvPr id="3" name="Image 2"/>
+          <p:cNvPicPr>
+            <a:picLocks noChangeAspect="1"/>
+          </p:cNvPicPr>
+          <p:nvPr/>
+        </p:nvPicPr>
+        <p:blipFill>
+          <a:blip r:embed="rId3"/>
+          <a:stretch>
+            <a:fillRect/>
+          </a:stretch>
+        </p:blipFill>
+        <p:spPr>
+          <a:xfrm>
+            <a:off x="1620492" y="1499760"/>
+            <a:ext cx="9126356" cy="4522960"/>
+          </a:xfrm>
+          <a:prstGeom prst="rect">
+            <a:avLst/>
+          </a:prstGeom>
+        </p:spPr>
+      </p:pic>
+    </p:spTree>
+    <p:extLst>
+      <p:ext uri="{BB962C8B-B14F-4D97-AF65-F5344CB8AC3E}">
+        <p14:creationId xmlns:p14="http://schemas.microsoft.com/office/powerpoint/2010/main" val="399252477"/>
+      </p:ext>
+    </p:extLst>
+  </p:cSld>
+  <p:clrMapOvr>
+    <a:masterClrMapping/>
+  </p:clrMapOvr>
+  <mc:AlternateContent xmlns:mc="http://schemas.openxmlformats.org/markup-compatibility/2006" xmlns:p14="http://schemas.microsoft.com/office/powerpoint/2010/main">
+    <mc:Choice Requires="p14">
+      <p:transition spd="slow" p14:dur="2000"/>
+    </mc:Choice>
+    <mc:Fallback xmlns:p15="http://schemas.microsoft.com/office/powerpoint/2012/main" xmlns="">
+      <p:transition spd="slow"/>
+    </mc:Fallback>
+  </mc:AlternateContent>
+  <p:timing>
+    <p:tnLst>
+      <p:par>
+        <p:cTn id="1" dur="indefinite" restart="never" nodeType="tmRoot"/>
+      </p:par>
+    </p:tnLst>
+  </p:timing>
+</p:sld>
+</file>
+
+<file path=ppt/slides/slide7.xml><?xml version="1.0" encoding="utf-8"?>
+<p:sld xmlns:a="http://schemas.openxmlformats.org/drawingml/2006/main" xmlns:r="http://schemas.openxmlformats.org/officeDocument/2006/relationships" xmlns:p="http://schemas.openxmlformats.org/presentationml/2006/main">
+  <p:cSld>
+    <p:bg>
+      <p:bgPr>
+        <a:blipFill rotWithShape="0">
+          <a:blip r:embed="rId2">
+            <a:alphaModFix amt="40000"/>
+          </a:blip>
+          <a:stretch/>
+        </a:blipFill>
+        <a:effectLst/>
+      </p:bgPr>
+    </p:bg>
+    <p:spTree>
+      <p:nvGrpSpPr>
+        <p:cNvPr id="1" name=""/>
+        <p:cNvGrpSpPr/>
+        <p:nvPr/>
+      </p:nvGrpSpPr>
+      <p:grpSpPr>
+        <a:xfrm>
+          <a:off x="0" y="0"/>
+          <a:ext cx="0" cy="0"/>
+          <a:chOff x="0" y="0"/>
+          <a:chExt cx="0" cy="0"/>
+        </a:xfrm>
+      </p:grpSpPr>
+      <p:sp>
+        <p:nvSpPr>
+          <p:cNvPr id="84" name="PlaceHolder 1"/>
+          <p:cNvSpPr>
+            <a:spLocks noGrp="1"/>
+          </p:cNvSpPr>
+          <p:nvPr>
+            <p:ph type="title"/>
+          </p:nvPr>
+        </p:nvSpPr>
+        <p:spPr>
+          <a:xfrm>
+            <a:off x="757440" y="2314800"/>
+            <a:ext cx="10514880" cy="1324800"/>
+          </a:xfrm>
+          <a:prstGeom prst="rect">
+            <a:avLst/>
+          </a:prstGeom>
+          <a:noFill/>
+          <a:ln w="0">
+            <a:noFill/>
+          </a:ln>
+        </p:spPr>
+        <p:txBody>
+          <a:bodyPr lIns="90000" tIns="45000" rIns="90000" bIns="45000" anchor="ctr">
+            <a:normAutofit/>
+          </a:bodyPr>
+          <a:lstStyle/>
+          <a:p>
+            <a:pPr algn="ctr">
+              <a:lnSpc>
+                <a:spcPct val="90000"/>
+              </a:lnSpc>
+            </a:pPr>
+            <a:r>
+              <a:rPr lang="fr-FR" sz="6000" b="0" strike="noStrike" spc="-1">
+                <a:solidFill>
+                  <a:srgbClr val="000000"/>
+                </a:solidFill>
+                <a:latin typeface="Agency FB"/>
+              </a:rPr>
+              <a:t>Retro</a:t>
+            </a:r>
+            <a:endParaRPr lang="fr-FR" sz="6000" b="0" strike="noStrike" spc="-1">
+              <a:latin typeface="Arial"/>
+            </a:endParaRPr>
+          </a:p>
+        </p:txBody>
+      </p:sp>
+    </p:spTree>
+  </p:cSld>
+  <p:clrMapOvr>
+    <a:masterClrMapping/>
+  </p:clrMapOvr>
+  <mc:AlternateContent xmlns:mc="http://schemas.openxmlformats.org/markup-compatibility/2006" xmlns:p14="http://schemas.microsoft.com/office/powerpoint/2010/main">
+    <mc:Choice Requires="p14">
+      <p:transition spd="slow" p14:dur="2000"/>
+    </mc:Choice>
+    <mc:Fallback xmlns:p15="http://schemas.microsoft.com/office/powerpoint/2012/main" xmlns="">
+      <p:transition spd="slow"/>
+    </mc:Fallback>
+  </mc:AlternateContent>
+  <p:timing>
+    <p:tnLst>
+      <p:par>
+        <p:cTn id="1" dur="indefinite" restart="never" nodeType="tmRoot"/>
+      </p:par>
+    </p:tnLst>
+  </p:timing>
+</p:sld>
+</file>
+
+<file path=ppt/slides/slide8.xml><?xml version="1.0" encoding="utf-8"?>
+<p:sld xmlns:a="http://schemas.openxmlformats.org/drawingml/2006/main" xmlns:r="http://schemas.openxmlformats.org/officeDocument/2006/relationships" xmlns:p="http://schemas.openxmlformats.org/presentationml/2006/main">
+  <p:cSld>
+    <p:bg>
+      <p:bgPr>
+        <a:blipFill rotWithShape="0">
+          <a:blip r:embed="rId2">
+            <a:alphaModFix amt="40000"/>
+          </a:blip>
+          <a:stretch/>
+        </a:blipFill>
+        <a:effectLst/>
+      </p:bgPr>
+    </p:bg>
+    <p:spTree>
+      <p:nvGrpSpPr>
+        <p:cNvPr id="1" name=""/>
+        <p:cNvGrpSpPr/>
+        <p:nvPr/>
+      </p:nvGrpSpPr>
+      <p:grpSpPr>
+        <a:xfrm>
+          <a:off x="0" y="0"/>
+          <a:ext cx="0" cy="0"/>
+          <a:chOff x="0" y="0"/>
+          <a:chExt cx="0" cy="0"/>
+        </a:xfrm>
+      </p:grpSpPr>
+      <p:sp>
+        <p:nvSpPr>
           <p:cNvPr id="85" name="PlaceHolder 1"/>
           <p:cNvSpPr>
             <a:spLocks noGrp="1"/>
@@ -5019,7 +5583,7 @@
     <mc:Choice Requires="p14">
       <p:transition spd="slow" p14:dur="2000"/>
     </mc:Choice>
-    <mc:Fallback xmlns="" xmlns:p15="http://schemas.microsoft.com/office/powerpoint/2012/main">
+    <mc:Fallback xmlns:p15="http://schemas.microsoft.com/office/powerpoint/2012/main" xmlns="">
       <p:transition spd="slow"/>
     </mc:Fallback>
   </mc:AlternateContent>

</xml_diff>